<commit_message>
FIX: Update arrangement in trackintel figure
Some of the elements were not correctly aligned
</commit_message>
<xml_diff>
--- a/docs/assets/visualisation_editable.pptx
+++ b/docs/assets/visualisation_editable.pptx
@@ -263,7 +263,7 @@
           <a:p>
             <a:fld id="{253D7252-5E3B-0F41-AB28-80CA19715272}" type="datetimeFigureOut">
               <a:rPr lang="en-GB" smtClean="0"/>
-              <a:t>28/02/2021</a:t>
+              <a:t>12/05/2022</a:t>
             </a:fld>
             <a:endParaRPr lang="en-GB"/>
           </a:p>
@@ -463,7 +463,7 @@
           <a:p>
             <a:fld id="{253D7252-5E3B-0F41-AB28-80CA19715272}" type="datetimeFigureOut">
               <a:rPr lang="en-GB" smtClean="0"/>
-              <a:t>28/02/2021</a:t>
+              <a:t>12/05/2022</a:t>
             </a:fld>
             <a:endParaRPr lang="en-GB"/>
           </a:p>
@@ -673,7 +673,7 @@
           <a:p>
             <a:fld id="{253D7252-5E3B-0F41-AB28-80CA19715272}" type="datetimeFigureOut">
               <a:rPr lang="en-GB" smtClean="0"/>
-              <a:t>28/02/2021</a:t>
+              <a:t>12/05/2022</a:t>
             </a:fld>
             <a:endParaRPr lang="en-GB"/>
           </a:p>
@@ -873,7 +873,7 @@
           <a:p>
             <a:fld id="{253D7252-5E3B-0F41-AB28-80CA19715272}" type="datetimeFigureOut">
               <a:rPr lang="en-GB" smtClean="0"/>
-              <a:t>28/02/2021</a:t>
+              <a:t>12/05/2022</a:t>
             </a:fld>
             <a:endParaRPr lang="en-GB"/>
           </a:p>
@@ -1149,7 +1149,7 @@
           <a:p>
             <a:fld id="{253D7252-5E3B-0F41-AB28-80CA19715272}" type="datetimeFigureOut">
               <a:rPr lang="en-GB" smtClean="0"/>
-              <a:t>28/02/2021</a:t>
+              <a:t>12/05/2022</a:t>
             </a:fld>
             <a:endParaRPr lang="en-GB"/>
           </a:p>
@@ -1417,7 +1417,7 @@
           <a:p>
             <a:fld id="{253D7252-5E3B-0F41-AB28-80CA19715272}" type="datetimeFigureOut">
               <a:rPr lang="en-GB" smtClean="0"/>
-              <a:t>28/02/2021</a:t>
+              <a:t>12/05/2022</a:t>
             </a:fld>
             <a:endParaRPr lang="en-GB"/>
           </a:p>
@@ -1832,7 +1832,7 @@
           <a:p>
             <a:fld id="{253D7252-5E3B-0F41-AB28-80CA19715272}" type="datetimeFigureOut">
               <a:rPr lang="en-GB" smtClean="0"/>
-              <a:t>28/02/2021</a:t>
+              <a:t>12/05/2022</a:t>
             </a:fld>
             <a:endParaRPr lang="en-GB"/>
           </a:p>
@@ -1974,7 +1974,7 @@
           <a:p>
             <a:fld id="{253D7252-5E3B-0F41-AB28-80CA19715272}" type="datetimeFigureOut">
               <a:rPr lang="en-GB" smtClean="0"/>
-              <a:t>28/02/2021</a:t>
+              <a:t>12/05/2022</a:t>
             </a:fld>
             <a:endParaRPr lang="en-GB"/>
           </a:p>
@@ -2087,7 +2087,7 @@
           <a:p>
             <a:fld id="{253D7252-5E3B-0F41-AB28-80CA19715272}" type="datetimeFigureOut">
               <a:rPr lang="en-GB" smtClean="0"/>
-              <a:t>28/02/2021</a:t>
+              <a:t>12/05/2022</a:t>
             </a:fld>
             <a:endParaRPr lang="en-GB"/>
           </a:p>
@@ -2400,7 +2400,7 @@
           <a:p>
             <a:fld id="{253D7252-5E3B-0F41-AB28-80CA19715272}" type="datetimeFigureOut">
               <a:rPr lang="en-GB" smtClean="0"/>
-              <a:t>28/02/2021</a:t>
+              <a:t>12/05/2022</a:t>
             </a:fld>
             <a:endParaRPr lang="en-GB"/>
           </a:p>
@@ -2689,7 +2689,7 @@
           <a:p>
             <a:fld id="{253D7252-5E3B-0F41-AB28-80CA19715272}" type="datetimeFigureOut">
               <a:rPr lang="en-GB" smtClean="0"/>
-              <a:t>28/02/2021</a:t>
+              <a:t>12/05/2022</a:t>
             </a:fld>
             <a:endParaRPr lang="en-GB"/>
           </a:p>
@@ -2932,7 +2932,7 @@
           <a:p>
             <a:fld id="{253D7252-5E3B-0F41-AB28-80CA19715272}" type="datetimeFigureOut">
               <a:rPr lang="en-GB" smtClean="0"/>
-              <a:t>28/02/2021</a:t>
+              <a:t>12/05/2022</a:t>
             </a:fld>
             <a:endParaRPr lang="en-GB"/>
           </a:p>
@@ -3349,6 +3349,80 @@
           <a:chExt cx="0" cy="0"/>
         </a:xfrm>
       </p:grpSpPr>
+      <p:sp>
+        <p:nvSpPr>
+          <p:cNvPr id="67" name="Textfeld 66">
+            <a:extLst>
+              <a:ext uri="{FF2B5EF4-FFF2-40B4-BE49-F238E27FC236}">
+                <a16:creationId xmlns:a16="http://schemas.microsoft.com/office/drawing/2014/main" id="{D217EEC3-C2EE-2948-B2E5-39AB76DFB268}"/>
+              </a:ext>
+            </a:extLst>
+          </p:cNvPr>
+          <p:cNvSpPr txBox="1"/>
+          <p:nvPr/>
+        </p:nvSpPr>
+        <p:spPr>
+          <a:xfrm>
+            <a:off x="3452020" y="3488250"/>
+            <a:ext cx="1440000" cy="369332"/>
+          </a:xfrm>
+          <a:prstGeom prst="rect">
+            <a:avLst/>
+          </a:prstGeom>
+          <a:noFill/>
+        </p:spPr>
+        <p:txBody>
+          <a:bodyPr wrap="square" rtlCol="0">
+            <a:spAutoFit/>
+          </a:bodyPr>
+          <a:lstStyle/>
+          <a:p>
+            <a:pPr algn="r"/>
+            <a:r>
+              <a:rPr lang="en-GB" dirty="0" err="1"/>
+              <a:t>Positionfixes</a:t>
+            </a:r>
+            <a:endParaRPr lang="en-GB" dirty="0"/>
+          </a:p>
+        </p:txBody>
+      </p:sp>
+      <p:sp>
+        <p:nvSpPr>
+          <p:cNvPr id="116" name="Textfeld 115">
+            <a:extLst>
+              <a:ext uri="{FF2B5EF4-FFF2-40B4-BE49-F238E27FC236}">
+                <a16:creationId xmlns:a16="http://schemas.microsoft.com/office/drawing/2014/main" id="{CD696E9D-5BD7-084A-926B-D47EE302A343}"/>
+              </a:ext>
+            </a:extLst>
+          </p:cNvPr>
+          <p:cNvSpPr txBox="1"/>
+          <p:nvPr/>
+        </p:nvSpPr>
+        <p:spPr>
+          <a:xfrm>
+            <a:off x="3452020" y="3101646"/>
+            <a:ext cx="1440000" cy="369332"/>
+          </a:xfrm>
+          <a:prstGeom prst="rect">
+            <a:avLst/>
+          </a:prstGeom>
+          <a:noFill/>
+        </p:spPr>
+        <p:txBody>
+          <a:bodyPr wrap="square" rtlCol="0">
+            <a:spAutoFit/>
+          </a:bodyPr>
+          <a:lstStyle/>
+          <a:p>
+            <a:pPr algn="r"/>
+            <a:r>
+              <a:rPr lang="en-GB" dirty="0" err="1"/>
+              <a:t>Staypoints</a:t>
+            </a:r>
+            <a:endParaRPr lang="en-GB" dirty="0"/>
+          </a:p>
+        </p:txBody>
+      </p:sp>
       <p:pic>
         <p:nvPicPr>
           <p:cNvPr id="4" name="Grafik 3">
@@ -3363,15 +3437,15 @@
           </p:cNvPicPr>
           <p:nvPr/>
         </p:nvPicPr>
-        <p:blipFill>
+        <p:blipFill rotWithShape="1">
           <a:blip r:embed="rId2"/>
-          <a:srcRect/>
+          <a:srcRect l="3831" r="9065"/>
           <a:stretch/>
         </p:blipFill>
         <p:spPr>
           <a:xfrm>
-            <a:off x="4642337" y="4101492"/>
-            <a:ext cx="5324719" cy="2349620"/>
+            <a:off x="4846319" y="4101492"/>
+            <a:ext cx="4638041" cy="2349620"/>
           </a:xfrm>
           <a:prstGeom prst="rect">
             <a:avLst/>
@@ -3394,7 +3468,7 @@
         </p:nvSpPr>
         <p:spPr>
           <a:xfrm>
-            <a:off x="5435527" y="3616113"/>
+            <a:off x="5638727" y="3616113"/>
             <a:ext cx="45719" cy="45719"/>
           </a:xfrm>
           <a:prstGeom prst="ellipse">
@@ -3442,7 +3516,7 @@
         </p:nvCxnSpPr>
         <p:spPr>
           <a:xfrm>
-            <a:off x="4812490" y="2223625"/>
+            <a:off x="5015690" y="2223625"/>
             <a:ext cx="1687440" cy="711021"/>
           </a:xfrm>
           <a:prstGeom prst="line">
@@ -3487,7 +3561,7 @@
         </p:nvCxnSpPr>
         <p:spPr>
           <a:xfrm flipH="1">
-            <a:off x="6495636" y="2737971"/>
+            <a:off x="6698836" y="2737971"/>
             <a:ext cx="747980" cy="188691"/>
           </a:xfrm>
           <a:prstGeom prst="line">
@@ -3532,7 +3606,7 @@
         </p:nvCxnSpPr>
         <p:spPr>
           <a:xfrm flipV="1">
-            <a:off x="7243616" y="1527704"/>
+            <a:off x="7446816" y="1527704"/>
             <a:ext cx="1829696" cy="1210267"/>
           </a:xfrm>
           <a:prstGeom prst="line">
@@ -3577,7 +3651,7 @@
         </p:nvCxnSpPr>
         <p:spPr>
           <a:xfrm flipH="1">
-            <a:off x="4806286" y="1757245"/>
+            <a:off x="5009486" y="1757245"/>
             <a:ext cx="8536" cy="4260219"/>
           </a:xfrm>
           <a:prstGeom prst="line">
@@ -3623,7 +3697,7 @@
         </p:nvCxnSpPr>
         <p:spPr>
           <a:xfrm>
-            <a:off x="6495636" y="2313415"/>
+            <a:off x="6698836" y="2313415"/>
             <a:ext cx="4294" cy="3153799"/>
           </a:xfrm>
           <a:prstGeom prst="line">
@@ -3669,7 +3743,7 @@
         </p:nvCxnSpPr>
         <p:spPr>
           <a:xfrm>
-            <a:off x="7243616" y="2134996"/>
+            <a:off x="7446816" y="2134996"/>
             <a:ext cx="0" cy="3521376"/>
           </a:xfrm>
           <a:prstGeom prst="line">
@@ -3715,7 +3789,7 @@
         </p:nvCxnSpPr>
         <p:spPr>
           <a:xfrm>
-            <a:off x="9073312" y="918195"/>
+            <a:off x="9276512" y="918195"/>
             <a:ext cx="0" cy="4335784"/>
           </a:xfrm>
           <a:prstGeom prst="line">
@@ -3759,7 +3833,7 @@
         </p:nvGrpSpPr>
         <p:grpSpPr>
           <a:xfrm>
-            <a:off x="4812490" y="904889"/>
+            <a:off x="5015690" y="904889"/>
             <a:ext cx="4260822" cy="1406942"/>
             <a:chOff x="6992983" y="406568"/>
             <a:chExt cx="4260822" cy="1406942"/>
@@ -3918,7 +3992,7 @@
         </p:nvSpPr>
         <p:spPr>
           <a:xfrm>
-            <a:off x="2743200" y="5826552"/>
+            <a:off x="2580692" y="5750352"/>
             <a:ext cx="1852247" cy="646331"/>
           </a:xfrm>
           <a:prstGeom prst="rect">
@@ -3942,10 +4016,10 @@
       </p:sp>
       <p:sp>
         <p:nvSpPr>
-          <p:cNvPr id="67" name="Textfeld 66">
-            <a:extLst>
-              <a:ext uri="{FF2B5EF4-FFF2-40B4-BE49-F238E27FC236}">
-                <a16:creationId xmlns:a16="http://schemas.microsoft.com/office/drawing/2014/main" id="{D217EEC3-C2EE-2948-B2E5-39AB76DFB268}"/>
+          <p:cNvPr id="68" name="Textfeld 67">
+            <a:extLst>
+              <a:ext uri="{FF2B5EF4-FFF2-40B4-BE49-F238E27FC236}">
+                <a16:creationId xmlns:a16="http://schemas.microsoft.com/office/drawing/2014/main" id="{C1C0C231-17F4-E04E-A180-5DACBF482DD3}"/>
               </a:ext>
             </a:extLst>
           </p:cNvPr>
@@ -3954,45 +4028,8 @@
         </p:nvSpPr>
         <p:spPr>
           <a:xfrm>
-            <a:off x="2847185" y="3488250"/>
-            <a:ext cx="1565063" cy="369332"/>
-          </a:xfrm>
-          <a:prstGeom prst="rect">
-            <a:avLst/>
-          </a:prstGeom>
-          <a:noFill/>
-        </p:spPr>
-        <p:txBody>
-          <a:bodyPr wrap="square" rtlCol="0">
-            <a:spAutoFit/>
-          </a:bodyPr>
-          <a:lstStyle/>
-          <a:p>
-            <a:pPr algn="r"/>
-            <a:r>
-              <a:rPr lang="en-GB" dirty="0" err="1"/>
-              <a:t>Positionfixes</a:t>
-            </a:r>
-            <a:endParaRPr lang="en-GB" dirty="0"/>
-          </a:p>
-        </p:txBody>
-      </p:sp>
-      <p:sp>
-        <p:nvSpPr>
-          <p:cNvPr id="68" name="Textfeld 67">
-            <a:extLst>
-              <a:ext uri="{FF2B5EF4-FFF2-40B4-BE49-F238E27FC236}">
-                <a16:creationId xmlns:a16="http://schemas.microsoft.com/office/drawing/2014/main" id="{C1C0C231-17F4-E04E-A180-5DACBF482DD3}"/>
-              </a:ext>
-            </a:extLst>
-          </p:cNvPr>
-          <p:cNvSpPr txBox="1"/>
-          <p:nvPr/>
-        </p:nvSpPr>
-        <p:spPr>
-          <a:xfrm>
-            <a:off x="3312056" y="2079554"/>
-            <a:ext cx="1122989" cy="369332"/>
+            <a:off x="3452020" y="2065112"/>
+            <a:ext cx="1440000" cy="369332"/>
           </a:xfrm>
           <a:prstGeom prst="rect">
             <a:avLst/>
@@ -4028,8 +4065,8 @@
         </p:nvSpPr>
         <p:spPr>
           <a:xfrm>
-            <a:off x="3439321" y="1416144"/>
-            <a:ext cx="985998" cy="369332"/>
+            <a:off x="3452020" y="1426161"/>
+            <a:ext cx="1440000" cy="369332"/>
           </a:xfrm>
           <a:prstGeom prst="rect">
             <a:avLst/>
@@ -4066,7 +4103,7 @@
         </p:nvSpPr>
         <p:spPr>
           <a:xfrm>
-            <a:off x="4751290" y="1538827"/>
+            <a:off x="4954490" y="1538827"/>
             <a:ext cx="144000" cy="144000"/>
           </a:xfrm>
           <a:prstGeom prst="ellipse">
@@ -4126,7 +4163,7 @@
         </p:nvSpPr>
         <p:spPr>
           <a:xfrm>
-            <a:off x="9001312" y="826355"/>
+            <a:off x="9204512" y="826355"/>
             <a:ext cx="144000" cy="144000"/>
           </a:xfrm>
           <a:prstGeom prst="ellipse">
@@ -4183,7 +4220,7 @@
         </p:nvSpPr>
         <p:spPr>
           <a:xfrm rot="1272920">
-            <a:off x="5347180" y="2633782"/>
+            <a:off x="5550380" y="2633782"/>
             <a:ext cx="643318" cy="369332"/>
           </a:xfrm>
           <a:prstGeom prst="rect">
@@ -4218,7 +4255,7 @@
         </p:nvSpPr>
         <p:spPr>
           <a:xfrm rot="20799469">
-            <a:off x="6552734" y="2896758"/>
+            <a:off x="6755934" y="2896758"/>
             <a:ext cx="521297" cy="369332"/>
           </a:xfrm>
           <a:prstGeom prst="rect">
@@ -4253,7 +4290,7 @@
         </p:nvSpPr>
         <p:spPr>
           <a:xfrm rot="19563812">
-            <a:off x="7879650" y="2114231"/>
+            <a:off x="8082850" y="2114231"/>
             <a:ext cx="652936" cy="369332"/>
           </a:xfrm>
           <a:prstGeom prst="rect">
@@ -4290,7 +4327,7 @@
         </p:nvSpPr>
         <p:spPr>
           <a:xfrm flipH="1">
-            <a:off x="5200680" y="3600862"/>
+            <a:off x="5403880" y="3600862"/>
             <a:ext cx="45719" cy="45719"/>
           </a:xfrm>
           <a:prstGeom prst="ellipse">
@@ -4338,7 +4375,7 @@
         </p:nvSpPr>
         <p:spPr>
           <a:xfrm>
-            <a:off x="4860079" y="3505988"/>
+            <a:off x="5063279" y="3505988"/>
             <a:ext cx="45719" cy="45719"/>
           </a:xfrm>
           <a:prstGeom prst="ellipse">
@@ -4386,7 +4423,7 @@
         </p:nvSpPr>
         <p:spPr>
           <a:xfrm>
-            <a:off x="4817155" y="3452855"/>
+            <a:off x="5020355" y="3452855"/>
             <a:ext cx="45719" cy="45719"/>
           </a:xfrm>
           <a:prstGeom prst="ellipse">
@@ -4434,7 +4471,7 @@
         </p:nvSpPr>
         <p:spPr>
           <a:xfrm>
-            <a:off x="4838794" y="3388498"/>
+            <a:off x="5041994" y="3388498"/>
             <a:ext cx="45719" cy="45719"/>
           </a:xfrm>
           <a:prstGeom prst="ellipse">
@@ -4482,7 +4519,7 @@
         </p:nvSpPr>
         <p:spPr>
           <a:xfrm>
-            <a:off x="4941556" y="3571921"/>
+            <a:off x="5144756" y="3571921"/>
             <a:ext cx="45719" cy="45719"/>
           </a:xfrm>
           <a:prstGeom prst="ellipse">
@@ -4530,7 +4567,7 @@
         </p:nvSpPr>
         <p:spPr>
           <a:xfrm>
-            <a:off x="5029444" y="3589817"/>
+            <a:off x="5232644" y="3589817"/>
             <a:ext cx="45719" cy="45719"/>
           </a:xfrm>
           <a:prstGeom prst="ellipse">
@@ -4578,7 +4615,7 @@
         </p:nvSpPr>
         <p:spPr>
           <a:xfrm>
-            <a:off x="5797544" y="3619500"/>
+            <a:off x="6000744" y="3619500"/>
             <a:ext cx="45719" cy="45719"/>
           </a:xfrm>
           <a:prstGeom prst="ellipse">
@@ -4626,7 +4663,7 @@
         </p:nvSpPr>
         <p:spPr>
           <a:xfrm>
-            <a:off x="5956664" y="3660552"/>
+            <a:off x="6159864" y="3660552"/>
             <a:ext cx="45719" cy="45719"/>
           </a:xfrm>
           <a:prstGeom prst="ellipse">
@@ -4674,7 +4711,7 @@
         </p:nvSpPr>
         <p:spPr>
           <a:xfrm>
-            <a:off x="6089881" y="3728275"/>
+            <a:off x="6293081" y="3728275"/>
             <a:ext cx="45719" cy="45719"/>
           </a:xfrm>
           <a:prstGeom prst="ellipse">
@@ -4722,7 +4759,7 @@
         </p:nvSpPr>
         <p:spPr>
           <a:xfrm>
-            <a:off x="6219861" y="3715544"/>
+            <a:off x="6423061" y="3715544"/>
             <a:ext cx="45719" cy="45719"/>
           </a:xfrm>
           <a:prstGeom prst="ellipse">
@@ -4770,7 +4807,7 @@
         </p:nvSpPr>
         <p:spPr>
           <a:xfrm>
-            <a:off x="6304154" y="3751134"/>
+            <a:off x="6507354" y="3751134"/>
             <a:ext cx="45719" cy="45719"/>
           </a:xfrm>
           <a:prstGeom prst="ellipse">
@@ -4818,7 +4855,7 @@
         </p:nvSpPr>
         <p:spPr>
           <a:xfrm>
-            <a:off x="6358493" y="3769519"/>
+            <a:off x="6561693" y="3769519"/>
             <a:ext cx="45719" cy="45719"/>
           </a:xfrm>
           <a:prstGeom prst="ellipse">
@@ -4866,7 +4903,7 @@
         </p:nvSpPr>
         <p:spPr>
           <a:xfrm>
-            <a:off x="6420967" y="3780344"/>
+            <a:off x="6624167" y="3780344"/>
             <a:ext cx="45719" cy="45719"/>
           </a:xfrm>
           <a:prstGeom prst="ellipse">
@@ -4914,7 +4951,7 @@
         </p:nvSpPr>
         <p:spPr>
           <a:xfrm>
-            <a:off x="6418366" y="3714329"/>
+            <a:off x="6621566" y="3714329"/>
             <a:ext cx="45719" cy="45719"/>
           </a:xfrm>
           <a:prstGeom prst="ellipse">
@@ -4962,7 +4999,7 @@
         </p:nvSpPr>
         <p:spPr>
           <a:xfrm>
-            <a:off x="6443826" y="3856336"/>
+            <a:off x="6647026" y="3856336"/>
             <a:ext cx="45719" cy="45719"/>
           </a:xfrm>
           <a:prstGeom prst="ellipse">
@@ -5010,7 +5047,7 @@
         </p:nvSpPr>
         <p:spPr>
           <a:xfrm>
-            <a:off x="6412583" y="3681322"/>
+            <a:off x="6615783" y="3681322"/>
             <a:ext cx="45719" cy="45719"/>
           </a:xfrm>
           <a:prstGeom prst="ellipse">
@@ -5058,7 +5095,7 @@
         </p:nvSpPr>
         <p:spPr>
           <a:xfrm>
-            <a:off x="6527115" y="3767257"/>
+            <a:off x="6730315" y="3767257"/>
             <a:ext cx="45719" cy="45719"/>
           </a:xfrm>
           <a:prstGeom prst="ellipse">
@@ -5106,7 +5143,7 @@
         </p:nvSpPr>
         <p:spPr>
           <a:xfrm>
-            <a:off x="6679972" y="3737188"/>
+            <a:off x="6883172" y="3737188"/>
             <a:ext cx="45719" cy="45719"/>
           </a:xfrm>
           <a:prstGeom prst="ellipse">
@@ -5154,7 +5191,7 @@
         </p:nvSpPr>
         <p:spPr>
           <a:xfrm>
-            <a:off x="6805841" y="3669046"/>
+            <a:off x="7009041" y="3669046"/>
             <a:ext cx="45719" cy="45719"/>
           </a:xfrm>
           <a:prstGeom prst="ellipse">
@@ -5202,7 +5239,7 @@
         </p:nvSpPr>
         <p:spPr>
           <a:xfrm>
-            <a:off x="6919649" y="3513529"/>
+            <a:off x="7122849" y="3513529"/>
             <a:ext cx="45719" cy="45719"/>
           </a:xfrm>
           <a:prstGeom prst="ellipse">
@@ -5250,7 +5287,7 @@
         </p:nvSpPr>
         <p:spPr>
           <a:xfrm>
-            <a:off x="7022410" y="3475714"/>
+            <a:off x="7225610" y="3475714"/>
             <a:ext cx="45719" cy="45719"/>
           </a:xfrm>
           <a:prstGeom prst="ellipse">
@@ -5298,7 +5335,7 @@
         </p:nvSpPr>
         <p:spPr>
           <a:xfrm>
-            <a:off x="7158462" y="3444871"/>
+            <a:off x="7361662" y="3444871"/>
             <a:ext cx="45719" cy="45719"/>
           </a:xfrm>
           <a:prstGeom prst="ellipse">
@@ -5346,7 +5383,7 @@
         </p:nvSpPr>
         <p:spPr>
           <a:xfrm>
-            <a:off x="7193336" y="3495617"/>
+            <a:off x="7396536" y="3495617"/>
             <a:ext cx="45719" cy="45719"/>
           </a:xfrm>
           <a:prstGeom prst="ellipse">
@@ -5394,7 +5431,7 @@
         </p:nvSpPr>
         <p:spPr>
           <a:xfrm>
-            <a:off x="7256757" y="3467730"/>
+            <a:off x="7459957" y="3467730"/>
             <a:ext cx="45719" cy="45719"/>
           </a:xfrm>
           <a:prstGeom prst="ellipse">
@@ -5442,7 +5479,7 @@
         </p:nvSpPr>
         <p:spPr>
           <a:xfrm>
-            <a:off x="7260192" y="3373060"/>
+            <a:off x="7463392" y="3373060"/>
             <a:ext cx="45719" cy="45719"/>
           </a:xfrm>
           <a:prstGeom prst="ellipse">
@@ -5490,7 +5527,7 @@
         </p:nvSpPr>
         <p:spPr>
           <a:xfrm>
-            <a:off x="7408920" y="3380347"/>
+            <a:off x="7612120" y="3380347"/>
             <a:ext cx="45719" cy="45719"/>
           </a:xfrm>
           <a:prstGeom prst="ellipse">
@@ -5538,7 +5575,7 @@
         </p:nvSpPr>
         <p:spPr>
           <a:xfrm>
-            <a:off x="7570033" y="3307318"/>
+            <a:off x="7773233" y="3307318"/>
             <a:ext cx="45719" cy="45719"/>
           </a:xfrm>
           <a:prstGeom prst="ellipse">
@@ -5586,7 +5623,7 @@
         </p:nvSpPr>
         <p:spPr>
           <a:xfrm>
-            <a:off x="7809307" y="3167965"/>
+            <a:off x="8012507" y="3167965"/>
             <a:ext cx="45719" cy="45719"/>
           </a:xfrm>
           <a:prstGeom prst="ellipse">
@@ -5634,7 +5671,7 @@
         </p:nvSpPr>
         <p:spPr>
           <a:xfrm>
-            <a:off x="8145206" y="3048756"/>
+            <a:off x="8348406" y="3048756"/>
             <a:ext cx="45719" cy="45719"/>
           </a:xfrm>
           <a:prstGeom prst="ellipse">
@@ -5682,7 +5719,7 @@
         </p:nvSpPr>
         <p:spPr>
           <a:xfrm>
-            <a:off x="8283906" y="2956246"/>
+            <a:off x="8487106" y="2956246"/>
             <a:ext cx="45719" cy="45719"/>
           </a:xfrm>
           <a:prstGeom prst="ellipse">
@@ -5730,7 +5767,7 @@
         </p:nvSpPr>
         <p:spPr>
           <a:xfrm>
-            <a:off x="8439042" y="2880215"/>
+            <a:off x="8642242" y="2880215"/>
             <a:ext cx="45719" cy="45719"/>
           </a:xfrm>
           <a:prstGeom prst="ellipse">
@@ -5778,7 +5815,7 @@
         </p:nvSpPr>
         <p:spPr>
           <a:xfrm>
-            <a:off x="8557209" y="2787274"/>
+            <a:off x="8760409" y="2787274"/>
             <a:ext cx="45719" cy="45719"/>
           </a:xfrm>
           <a:prstGeom prst="ellipse">
@@ -5826,7 +5863,7 @@
         </p:nvSpPr>
         <p:spPr>
           <a:xfrm>
-            <a:off x="8644142" y="2710001"/>
+            <a:off x="8847342" y="2710001"/>
             <a:ext cx="45719" cy="45719"/>
           </a:xfrm>
           <a:prstGeom prst="ellipse">
@@ -5874,7 +5911,7 @@
         </p:nvSpPr>
         <p:spPr>
           <a:xfrm>
-            <a:off x="8816571" y="2686234"/>
+            <a:off x="9019771" y="2686234"/>
             <a:ext cx="45719" cy="45719"/>
           </a:xfrm>
           <a:prstGeom prst="ellipse">
@@ -5922,7 +5959,7 @@
         </p:nvSpPr>
         <p:spPr>
           <a:xfrm>
-            <a:off x="9001312" y="2569462"/>
+            <a:off x="9204512" y="2569462"/>
             <a:ext cx="45719" cy="45719"/>
           </a:xfrm>
           <a:prstGeom prst="ellipse">
@@ -5968,7 +6005,7 @@
         </p:nvSpPr>
         <p:spPr>
           <a:xfrm>
-            <a:off x="6283130" y="3605436"/>
+            <a:off x="6486330" y="3605436"/>
             <a:ext cx="354739" cy="360365"/>
           </a:xfrm>
           <a:prstGeom prst="ellipse">
@@ -6017,7 +6054,7 @@
         </p:nvSpPr>
         <p:spPr>
           <a:xfrm>
-            <a:off x="2864724" y="3200855"/>
+            <a:off x="2653608" y="3121968"/>
             <a:ext cx="252000" cy="252000"/>
           </a:xfrm>
           <a:prstGeom prst="ellipse">
@@ -6052,47 +6089,57 @@
       </p:sp>
       <p:sp>
         <p:nvSpPr>
-          <p:cNvPr id="116" name="Textfeld 115">
-            <a:extLst>
-              <a:ext uri="{FF2B5EF4-FFF2-40B4-BE49-F238E27FC236}">
-                <a16:creationId xmlns:a16="http://schemas.microsoft.com/office/drawing/2014/main" id="{CD696E9D-5BD7-084A-926B-D47EE302A343}"/>
-              </a:ext>
-            </a:extLst>
-          </p:cNvPr>
-          <p:cNvSpPr txBox="1"/>
+          <p:cNvPr id="117" name="Oval 116">
+            <a:extLst>
+              <a:ext uri="{FF2B5EF4-FFF2-40B4-BE49-F238E27FC236}">
+                <a16:creationId xmlns:a16="http://schemas.microsoft.com/office/drawing/2014/main" id="{9AAA4B3D-F25C-AB43-A0A4-EBF5BDC99B19}"/>
+              </a:ext>
+            </a:extLst>
+          </p:cNvPr>
+          <p:cNvSpPr/>
           <p:nvPr/>
         </p:nvSpPr>
         <p:spPr>
           <a:xfrm>
-            <a:off x="3261391" y="3159965"/>
-            <a:ext cx="1154179" cy="369332"/>
-          </a:xfrm>
-          <a:prstGeom prst="rect">
+            <a:off x="7313487" y="3342276"/>
+            <a:ext cx="280652" cy="257805"/>
+          </a:xfrm>
+          <a:prstGeom prst="ellipse">
             <a:avLst/>
           </a:prstGeom>
           <a:noFill/>
         </p:spPr>
-        <p:txBody>
-          <a:bodyPr wrap="square" rtlCol="0">
-            <a:spAutoFit/>
-          </a:bodyPr>
-          <a:lstStyle/>
-          <a:p>
-            <a:pPr algn="r"/>
-            <a:r>
-              <a:rPr lang="en-GB" dirty="0" err="1"/>
-              <a:t>Staypoints</a:t>
-            </a:r>
-            <a:endParaRPr lang="en-GB" dirty="0"/>
-          </a:p>
-        </p:txBody>
-      </p:sp>
-      <p:sp>
-        <p:nvSpPr>
-          <p:cNvPr id="117" name="Oval 116">
-            <a:extLst>
-              <a:ext uri="{FF2B5EF4-FFF2-40B4-BE49-F238E27FC236}">
-                <a16:creationId xmlns:a16="http://schemas.microsoft.com/office/drawing/2014/main" id="{9AAA4B3D-F25C-AB43-A0A4-EBF5BDC99B19}"/>
+        <p:style>
+          <a:lnRef idx="2">
+            <a:schemeClr val="accent1">
+              <a:shade val="50000"/>
+            </a:schemeClr>
+          </a:lnRef>
+          <a:fillRef idx="1">
+            <a:schemeClr val="accent1"/>
+          </a:fillRef>
+          <a:effectRef idx="0">
+            <a:schemeClr val="accent1"/>
+          </a:effectRef>
+          <a:fontRef idx="minor">
+            <a:schemeClr val="lt1"/>
+          </a:fontRef>
+        </p:style>
+        <p:txBody>
+          <a:bodyPr rtlCol="0" anchor="ctr"/>
+          <a:lstStyle/>
+          <a:p>
+            <a:pPr algn="ctr"/>
+            <a:endParaRPr lang="de-DE"/>
+          </a:p>
+        </p:txBody>
+      </p:sp>
+      <p:sp>
+        <p:nvSpPr>
+          <p:cNvPr id="40" name="Freihandform 39">
+            <a:extLst>
+              <a:ext uri="{FF2B5EF4-FFF2-40B4-BE49-F238E27FC236}">
+                <a16:creationId xmlns:a16="http://schemas.microsoft.com/office/drawing/2014/main" id="{CB4FE847-272E-8F46-B3B9-9B73A158741C}"/>
               </a:ext>
             </a:extLst>
           </p:cNvPr>
@@ -6101,54 +6148,7 @@
         </p:nvSpPr>
         <p:spPr>
           <a:xfrm>
-            <a:off x="7110287" y="3342276"/>
-            <a:ext cx="280652" cy="257805"/>
-          </a:xfrm>
-          <a:prstGeom prst="ellipse">
-            <a:avLst/>
-          </a:prstGeom>
-          <a:noFill/>
-        </p:spPr>
-        <p:style>
-          <a:lnRef idx="2">
-            <a:schemeClr val="accent1">
-              <a:shade val="50000"/>
-            </a:schemeClr>
-          </a:lnRef>
-          <a:fillRef idx="1">
-            <a:schemeClr val="accent1"/>
-          </a:fillRef>
-          <a:effectRef idx="0">
-            <a:schemeClr val="accent1"/>
-          </a:effectRef>
-          <a:fontRef idx="minor">
-            <a:schemeClr val="lt1"/>
-          </a:fontRef>
-        </p:style>
-        <p:txBody>
-          <a:bodyPr rtlCol="0" anchor="ctr"/>
-          <a:lstStyle/>
-          <a:p>
-            <a:pPr algn="ctr"/>
-            <a:endParaRPr lang="de-DE"/>
-          </a:p>
-        </p:txBody>
-      </p:sp>
-      <p:sp>
-        <p:nvSpPr>
-          <p:cNvPr id="40" name="Freihandform 39">
-            <a:extLst>
-              <a:ext uri="{FF2B5EF4-FFF2-40B4-BE49-F238E27FC236}">
-                <a16:creationId xmlns:a16="http://schemas.microsoft.com/office/drawing/2014/main" id="{CB4FE847-272E-8F46-B3B9-9B73A158741C}"/>
-              </a:ext>
-            </a:extLst>
-          </p:cNvPr>
-          <p:cNvSpPr/>
-          <p:nvPr/>
-        </p:nvSpPr>
-        <p:spPr>
-          <a:xfrm>
-            <a:off x="4860234" y="208722"/>
+            <a:off x="5063434" y="208722"/>
             <a:ext cx="4186795" cy="1530626"/>
           </a:xfrm>
           <a:custGeom>
@@ -6277,8 +6277,8 @@
         </p:nvSpPr>
         <p:spPr>
           <a:xfrm>
-            <a:off x="3486212" y="688763"/>
-            <a:ext cx="985998" cy="369332"/>
+            <a:off x="3452020" y="708021"/>
+            <a:ext cx="1440000" cy="369332"/>
           </a:xfrm>
           <a:prstGeom prst="rect">
             <a:avLst/>
@@ -6315,7 +6315,7 @@
         </p:nvSpPr>
         <p:spPr>
           <a:xfrm>
-            <a:off x="3005035" y="3645390"/>
+            <a:off x="2756749" y="3660287"/>
             <a:ext cx="45719" cy="45719"/>
           </a:xfrm>
           <a:prstGeom prst="ellipse">
@@ -6349,121 +6349,32 @@
       </p:sp>
       <p:sp>
         <p:nvSpPr>
-          <p:cNvPr id="120" name="Oval 119">
-            <a:extLst>
-              <a:ext uri="{FF2B5EF4-FFF2-40B4-BE49-F238E27FC236}">
-                <a16:creationId xmlns:a16="http://schemas.microsoft.com/office/drawing/2014/main" id="{8FB5AFA0-6FBC-3946-85A6-052BE19E62FE}"/>
-              </a:ext>
-            </a:extLst>
-          </p:cNvPr>
-          <p:cNvSpPr>
-            <a:spLocks noChangeAspect="1"/>
-          </p:cNvSpPr>
-          <p:nvPr/>
-        </p:nvSpPr>
-        <p:spPr>
-          <a:xfrm flipH="1">
-            <a:off x="2770188" y="3630139"/>
-            <a:ext cx="45719" cy="45719"/>
-          </a:xfrm>
-          <a:prstGeom prst="ellipse">
-            <a:avLst/>
-          </a:prstGeom>
-        </p:spPr>
-        <p:style>
-          <a:lnRef idx="2">
-            <a:schemeClr val="dk1">
-              <a:shade val="50000"/>
-            </a:schemeClr>
-          </a:lnRef>
-          <a:fillRef idx="1">
-            <a:schemeClr val="dk1"/>
-          </a:fillRef>
-          <a:effectRef idx="0">
-            <a:schemeClr val="dk1"/>
-          </a:effectRef>
-          <a:fontRef idx="minor">
-            <a:schemeClr val="lt1"/>
-          </a:fontRef>
-        </p:style>
-        <p:txBody>
-          <a:bodyPr rtlCol="0" anchor="ctr"/>
-          <a:lstStyle/>
-          <a:p>
-            <a:pPr algn="ctr"/>
-            <a:endParaRPr lang="en-GB" dirty="0"/>
-          </a:p>
-        </p:txBody>
-      </p:sp>
-      <p:sp>
-        <p:nvSpPr>
-          <p:cNvPr id="121" name="Oval 120">
-            <a:extLst>
-              <a:ext uri="{FF2B5EF4-FFF2-40B4-BE49-F238E27FC236}">
-                <a16:creationId xmlns:a16="http://schemas.microsoft.com/office/drawing/2014/main" id="{8C8BFE74-DA38-664F-A680-D7FDACD3A232}"/>
-              </a:ext>
-            </a:extLst>
-          </p:cNvPr>
-          <p:cNvSpPr>
-            <a:spLocks noChangeAspect="1"/>
-          </p:cNvSpPr>
+          <p:cNvPr id="42" name="Textfeld 41">
+            <a:extLst>
+              <a:ext uri="{FF2B5EF4-FFF2-40B4-BE49-F238E27FC236}">
+                <a16:creationId xmlns:a16="http://schemas.microsoft.com/office/drawing/2014/main" id="{346F8FE1-E086-CD4F-B22E-F575F6AC8919}"/>
+              </a:ext>
+            </a:extLst>
+          </p:cNvPr>
+          <p:cNvSpPr txBox="1"/>
           <p:nvPr/>
         </p:nvSpPr>
         <p:spPr>
           <a:xfrm>
-            <a:off x="2598952" y="3619094"/>
-            <a:ext cx="45719" cy="45719"/>
-          </a:xfrm>
-          <a:prstGeom prst="ellipse">
-            <a:avLst/>
-          </a:prstGeom>
-        </p:spPr>
-        <p:style>
-          <a:lnRef idx="2">
-            <a:schemeClr val="dk1">
-              <a:shade val="50000"/>
-            </a:schemeClr>
-          </a:lnRef>
-          <a:fillRef idx="1">
-            <a:schemeClr val="dk1"/>
-          </a:fillRef>
-          <a:effectRef idx="0">
-            <a:schemeClr val="dk1"/>
-          </a:effectRef>
-          <a:fontRef idx="minor">
-            <a:schemeClr val="lt1"/>
-          </a:fontRef>
-        </p:style>
-        <p:txBody>
-          <a:bodyPr rtlCol="0" anchor="ctr"/>
-          <a:lstStyle/>
-          <a:p>
-            <a:pPr algn="ctr"/>
-            <a:endParaRPr lang="en-GB" dirty="0"/>
-          </a:p>
-        </p:txBody>
-      </p:sp>
-      <p:sp>
-        <p:nvSpPr>
-          <p:cNvPr id="41" name="Textfeld 40">
-            <a:extLst>
-              <a:ext uri="{FF2B5EF4-FFF2-40B4-BE49-F238E27FC236}">
-                <a16:creationId xmlns:a16="http://schemas.microsoft.com/office/drawing/2014/main" id="{2CD08859-4253-1E40-ACE2-DA7A32B37565}"/>
-              </a:ext>
-            </a:extLst>
-          </p:cNvPr>
-          <p:cNvSpPr txBox="1"/>
-          <p:nvPr/>
-        </p:nvSpPr>
-        <p:spPr>
-          <a:xfrm>
-            <a:off x="2619148" y="2422195"/>
-            <a:ext cx="1852247" cy="253916"/>
+            <a:off x="2604773" y="711187"/>
+            <a:ext cx="1369145" cy="1138773"/>
           </a:xfrm>
           <a:prstGeom prst="rect">
             <a:avLst/>
           </a:prstGeom>
           <a:noFill/>
+          <a:ln>
+            <a:solidFill>
+              <a:schemeClr val="bg1">
+                <a:lumMod val="50000"/>
+              </a:schemeClr>
+            </a:solidFill>
+          </a:ln>
         </p:spPr>
         <p:txBody>
           <a:bodyPr wrap="square" rtlCol="0">
@@ -6472,14 +6383,31 @@
           <a:lstStyle/>
           <a:p>
             <a:r>
-              <a:rPr lang="de-DE" sz="1050" dirty="0"/>
-              <a:t>Transport Mode </a:t>
+              <a:rPr lang="de-DE" dirty="0" err="1"/>
+              <a:t>Activities</a:t>
             </a:r>
+            <a:endParaRPr lang="de-DE" dirty="0"/>
+          </a:p>
+          <a:p>
             <a:r>
-              <a:rPr lang="de-DE" sz="1050" dirty="0" err="1"/>
-              <a:t>Identification</a:t>
+              <a:rPr lang="de-DE" sz="1400" dirty="0"/>
+              <a:t>e.g. </a:t>
             </a:r>
-            <a:endParaRPr lang="de-DE" sz="1050" dirty="0"/>
+          </a:p>
+          <a:p>
+            <a:r>
+              <a:rPr lang="de-DE" sz="1400" dirty="0"/>
+              <a:t>      Work</a:t>
+            </a:r>
+          </a:p>
+          <a:p>
+            <a:endParaRPr lang="de-DE" sz="800" dirty="0"/>
+          </a:p>
+          <a:p>
+            <a:r>
+              <a:rPr lang="de-DE" sz="1400" dirty="0"/>
+              <a:t>      Home</a:t>
+            </a:r>
           </a:p>
         </p:txBody>
       </p:sp>
@@ -6499,7 +6427,7 @@
         </p:nvSpPr>
         <p:spPr>
           <a:xfrm>
-            <a:off x="2374990" y="1556659"/>
+            <a:off x="2707608" y="1631530"/>
             <a:ext cx="144000" cy="144000"/>
           </a:xfrm>
           <a:prstGeom prst="ellipse">
@@ -6559,7 +6487,7 @@
         </p:nvSpPr>
         <p:spPr>
           <a:xfrm>
-            <a:off x="2365010" y="1263458"/>
+            <a:off x="2707608" y="1282149"/>
             <a:ext cx="144000" cy="144000"/>
           </a:xfrm>
           <a:prstGeom prst="ellipse">
@@ -6604,85 +6532,21 @@
       </p:sp>
       <p:sp>
         <p:nvSpPr>
-          <p:cNvPr id="42" name="Textfeld 41">
-            <a:extLst>
-              <a:ext uri="{FF2B5EF4-FFF2-40B4-BE49-F238E27FC236}">
-                <a16:creationId xmlns:a16="http://schemas.microsoft.com/office/drawing/2014/main" id="{346F8FE1-E086-CD4F-B22E-F575F6AC8919}"/>
-              </a:ext>
-            </a:extLst>
-          </p:cNvPr>
-          <p:cNvSpPr txBox="1"/>
+          <p:cNvPr id="124" name="Oval 123">
+            <a:extLst>
+              <a:ext uri="{FF2B5EF4-FFF2-40B4-BE49-F238E27FC236}">
+                <a16:creationId xmlns:a16="http://schemas.microsoft.com/office/drawing/2014/main" id="{392E569D-56C2-C248-A916-546956194E0B}"/>
+              </a:ext>
+            </a:extLst>
+          </p:cNvPr>
+          <p:cNvSpPr>
+            <a:spLocks noChangeAspect="1"/>
+          </p:cNvSpPr>
           <p:nvPr/>
         </p:nvSpPr>
         <p:spPr>
           <a:xfrm>
-            <a:off x="2284092" y="717154"/>
-            <a:ext cx="1369145" cy="1092607"/>
-          </a:xfrm>
-          <a:prstGeom prst="rect">
-            <a:avLst/>
-          </a:prstGeom>
-          <a:noFill/>
-          <a:ln>
-            <a:solidFill>
-              <a:schemeClr val="bg1">
-                <a:lumMod val="50000"/>
-              </a:schemeClr>
-            </a:solidFill>
-          </a:ln>
-        </p:spPr>
-        <p:txBody>
-          <a:bodyPr wrap="square" rtlCol="0">
-            <a:spAutoFit/>
-          </a:bodyPr>
-          <a:lstStyle/>
-          <a:p>
-            <a:r>
-              <a:rPr lang="de-DE" dirty="0" err="1"/>
-              <a:t>Activities</a:t>
-            </a:r>
-            <a:endParaRPr lang="de-DE" dirty="0"/>
-          </a:p>
-          <a:p>
-            <a:r>
-              <a:rPr lang="de-DE" sz="1100" dirty="0"/>
-              <a:t>e.g. </a:t>
-            </a:r>
-          </a:p>
-          <a:p>
-            <a:r>
-              <a:rPr lang="de-DE" sz="1400" dirty="0"/>
-              <a:t>     Work</a:t>
-            </a:r>
-          </a:p>
-          <a:p>
-            <a:endParaRPr lang="de-DE" sz="800" dirty="0"/>
-          </a:p>
-          <a:p>
-            <a:r>
-              <a:rPr lang="de-DE" sz="1400" dirty="0"/>
-              <a:t>      Home</a:t>
-            </a:r>
-          </a:p>
-        </p:txBody>
-      </p:sp>
-      <p:sp>
-        <p:nvSpPr>
-          <p:cNvPr id="124" name="Oval 123">
-            <a:extLst>
-              <a:ext uri="{FF2B5EF4-FFF2-40B4-BE49-F238E27FC236}">
-                <a16:creationId xmlns:a16="http://schemas.microsoft.com/office/drawing/2014/main" id="{392E569D-56C2-C248-A916-546956194E0B}"/>
-              </a:ext>
-            </a:extLst>
-          </p:cNvPr>
-          <p:cNvSpPr>
-            <a:spLocks noChangeAspect="1"/>
-          </p:cNvSpPr>
-          <p:nvPr/>
-        </p:nvSpPr>
-        <p:spPr>
-          <a:xfrm>
-            <a:off x="4752235" y="856516"/>
+            <a:off x="4955435" y="856516"/>
             <a:ext cx="144000" cy="144000"/>
           </a:xfrm>
           <a:prstGeom prst="ellipse">
@@ -6742,7 +6606,7 @@
         </p:nvSpPr>
         <p:spPr>
           <a:xfrm>
-            <a:off x="8975029" y="403736"/>
+            <a:off x="9178229" y="403736"/>
             <a:ext cx="144000" cy="144000"/>
           </a:xfrm>
           <a:prstGeom prst="ellipse">
@@ -6801,7 +6665,7 @@
         </p:nvSpPr>
         <p:spPr>
           <a:xfrm>
-            <a:off x="8978452" y="2649496"/>
+            <a:off x="9181652" y="2649496"/>
             <a:ext cx="45719" cy="45719"/>
           </a:xfrm>
           <a:prstGeom prst="ellipse">
@@ -6849,7 +6713,7 @@
         </p:nvSpPr>
         <p:spPr>
           <a:xfrm>
-            <a:off x="9027593" y="2477823"/>
+            <a:off x="9230793" y="2477823"/>
             <a:ext cx="45719" cy="45719"/>
           </a:xfrm>
           <a:prstGeom prst="ellipse">
@@ -6895,7 +6759,7 @@
         </p:nvSpPr>
         <p:spPr>
           <a:xfrm>
-            <a:off x="8928724" y="2452369"/>
+            <a:off x="9131924" y="2452369"/>
             <a:ext cx="257455" cy="262572"/>
           </a:xfrm>
           <a:prstGeom prst="ellipse">
@@ -6942,7 +6806,7 @@
         </p:nvSpPr>
         <p:spPr>
           <a:xfrm>
-            <a:off x="4723282" y="3325585"/>
+            <a:off x="4926482" y="3325585"/>
             <a:ext cx="257455" cy="262572"/>
           </a:xfrm>
           <a:prstGeom prst="ellipse">

</xml_diff>